<commit_message>
early cleanup and new title page
</commit_message>
<xml_diff>
--- a/figures/cover_page.pptx
+++ b/figures/cover_page.pptx
@@ -104,6 +104,11 @@
       </a:defRPr>
     </a:lvl9pPr>
   </p:defaultTextStyle>
+  <p:extLst>
+    <p:ext uri="{EFAFB233-063F-42B5-8137-9DF3F51BA10A}">
+      <p15:sldGuideLst xmlns:p15="http://schemas.microsoft.com/office/powerpoint/2012/main"/>
+    </p:ext>
+  </p:extLst>
 </p:presentation>
 </file>
 
@@ -238,7 +243,7 @@
           <a:p>
             <a:fld id="{9D0A19FE-C9DB-594E-B6DA-BE8D5EA5DEA3}" type="datetimeFigureOut">
               <a:rPr lang="en-US" smtClean="0"/>
-              <a:t>5/16/22</a:t>
+              <a:t>5/17/22</a:t>
             </a:fld>
             <a:endParaRPr lang="en-US"/>
           </a:p>
@@ -408,7 +413,7 @@
           <a:p>
             <a:fld id="{9D0A19FE-C9DB-594E-B6DA-BE8D5EA5DEA3}" type="datetimeFigureOut">
               <a:rPr lang="en-US" smtClean="0"/>
-              <a:t>5/16/22</a:t>
+              <a:t>5/17/22</a:t>
             </a:fld>
             <a:endParaRPr lang="en-US"/>
           </a:p>
@@ -588,7 +593,7 @@
           <a:p>
             <a:fld id="{9D0A19FE-C9DB-594E-B6DA-BE8D5EA5DEA3}" type="datetimeFigureOut">
               <a:rPr lang="en-US" smtClean="0"/>
-              <a:t>5/16/22</a:t>
+              <a:t>5/17/22</a:t>
             </a:fld>
             <a:endParaRPr lang="en-US"/>
           </a:p>
@@ -758,7 +763,7 @@
           <a:p>
             <a:fld id="{9D0A19FE-C9DB-594E-B6DA-BE8D5EA5DEA3}" type="datetimeFigureOut">
               <a:rPr lang="en-US" smtClean="0"/>
-              <a:t>5/16/22</a:t>
+              <a:t>5/17/22</a:t>
             </a:fld>
             <a:endParaRPr lang="en-US"/>
           </a:p>
@@ -1002,7 +1007,7 @@
           <a:p>
             <a:fld id="{9D0A19FE-C9DB-594E-B6DA-BE8D5EA5DEA3}" type="datetimeFigureOut">
               <a:rPr lang="en-US" smtClean="0"/>
-              <a:t>5/16/22</a:t>
+              <a:t>5/17/22</a:t>
             </a:fld>
             <a:endParaRPr lang="en-US"/>
           </a:p>
@@ -1234,7 +1239,7 @@
           <a:p>
             <a:fld id="{9D0A19FE-C9DB-594E-B6DA-BE8D5EA5DEA3}" type="datetimeFigureOut">
               <a:rPr lang="en-US" smtClean="0"/>
-              <a:t>5/16/22</a:t>
+              <a:t>5/17/22</a:t>
             </a:fld>
             <a:endParaRPr lang="en-US"/>
           </a:p>
@@ -1601,7 +1606,7 @@
           <a:p>
             <a:fld id="{9D0A19FE-C9DB-594E-B6DA-BE8D5EA5DEA3}" type="datetimeFigureOut">
               <a:rPr lang="en-US" smtClean="0"/>
-              <a:t>5/16/22</a:t>
+              <a:t>5/17/22</a:t>
             </a:fld>
             <a:endParaRPr lang="en-US"/>
           </a:p>
@@ -1719,7 +1724,7 @@
           <a:p>
             <a:fld id="{9D0A19FE-C9DB-594E-B6DA-BE8D5EA5DEA3}" type="datetimeFigureOut">
               <a:rPr lang="en-US" smtClean="0"/>
-              <a:t>5/16/22</a:t>
+              <a:t>5/17/22</a:t>
             </a:fld>
             <a:endParaRPr lang="en-US"/>
           </a:p>
@@ -1814,7 +1819,7 @@
           <a:p>
             <a:fld id="{9D0A19FE-C9DB-594E-B6DA-BE8D5EA5DEA3}" type="datetimeFigureOut">
               <a:rPr lang="en-US" smtClean="0"/>
-              <a:t>5/16/22</a:t>
+              <a:t>5/17/22</a:t>
             </a:fld>
             <a:endParaRPr lang="en-US"/>
           </a:p>
@@ -2091,7 +2096,7 @@
           <a:p>
             <a:fld id="{9D0A19FE-C9DB-594E-B6DA-BE8D5EA5DEA3}" type="datetimeFigureOut">
               <a:rPr lang="en-US" smtClean="0"/>
-              <a:t>5/16/22</a:t>
+              <a:t>5/17/22</a:t>
             </a:fld>
             <a:endParaRPr lang="en-US"/>
           </a:p>
@@ -2348,7 +2353,7 @@
           <a:p>
             <a:fld id="{9D0A19FE-C9DB-594E-B6DA-BE8D5EA5DEA3}" type="datetimeFigureOut">
               <a:rPr lang="en-US" smtClean="0"/>
-              <a:t>5/16/22</a:t>
+              <a:t>5/17/22</a:t>
             </a:fld>
             <a:endParaRPr lang="en-US"/>
           </a:p>
@@ -2561,7 +2566,7 @@
           <a:p>
             <a:fld id="{9D0A19FE-C9DB-594E-B6DA-BE8D5EA5DEA3}" type="datetimeFigureOut">
               <a:rPr lang="en-US" smtClean="0"/>
-              <a:t>5/16/22</a:t>
+              <a:t>5/17/22</a:t>
             </a:fld>
             <a:endParaRPr lang="en-US"/>
           </a:p>
@@ -2987,7 +2992,7 @@
         </p:blipFill>
         <p:spPr>
           <a:xfrm>
-            <a:off x="2427513" y="7149810"/>
+            <a:off x="2427513" y="7259639"/>
             <a:ext cx="1545772" cy="585703"/>
           </a:xfrm>
           <a:prstGeom prst="rect">
@@ -3009,8 +3014,8 @@
         </p:nvSpPr>
         <p:spPr>
           <a:xfrm>
-            <a:off x="1656455" y="5692241"/>
-            <a:ext cx="3087888" cy="400110"/>
+            <a:off x="187031" y="5016449"/>
+            <a:ext cx="6026727" cy="1015663"/>
           </a:xfrm>
           <a:prstGeom prst="rect">
             <a:avLst/>
@@ -3023,16 +3028,71 @@
           </a:bodyPr>
           <a:lstStyle/>
           <a:p>
-            <a:pPr algn="ctr"/>
-            <a:r>
-              <a:rPr lang="en-US" sz="2000" dirty="0" err="1">
+            <a:pPr algn="ctr">
+              <a:lnSpc>
+                <a:spcPct val="150000"/>
+              </a:lnSpc>
+            </a:pPr>
+            <a:r>
+              <a:rPr lang="en-US" sz="2800" dirty="0">
                 <a:latin typeface="Charter Roman" panose="02040503050506020203" pitchFamily="18" charset="0"/>
               </a:rPr>
-              <a:t>biologicalmodeling.org</a:t>
+              <a:t>Phillip </a:t>
+            </a:r>
+            <a:r>
+              <a:rPr lang="en-US" sz="2800" dirty="0" err="1">
+                <a:latin typeface="Charter Roman" panose="02040503050506020203" pitchFamily="18" charset="0"/>
+              </a:rPr>
+              <a:t>Compeau</a:t>
             </a:r>
             <a:endParaRPr lang="en-US" sz="2000" dirty="0">
               <a:latin typeface="Charter Roman" panose="02040503050506020203" pitchFamily="18" charset="0"/>
             </a:endParaRPr>
+          </a:p>
+          <a:p>
+            <a:pPr algn="ctr"/>
+            <a:r>
+              <a:rPr lang="en-US" dirty="0">
+                <a:latin typeface="Charter Roman" panose="02040503050506020203" pitchFamily="18" charset="0"/>
+              </a:rPr>
+              <a:t>with </a:t>
+            </a:r>
+            <a:r>
+              <a:rPr lang="en-US" dirty="0" err="1">
+                <a:latin typeface="Charter Roman" panose="02040503050506020203" pitchFamily="18" charset="0"/>
+              </a:rPr>
+              <a:t>Mert</a:t>
+            </a:r>
+            <a:r>
+              <a:rPr lang="en-US" dirty="0">
+                <a:latin typeface="Charter Roman" panose="02040503050506020203" pitchFamily="18" charset="0"/>
+              </a:rPr>
+              <a:t> </a:t>
+            </a:r>
+            <a:r>
+              <a:rPr lang="en-US" dirty="0" err="1">
+                <a:latin typeface="Charter Roman" panose="02040503050506020203" pitchFamily="18" charset="0"/>
+              </a:rPr>
+              <a:t>Inan</a:t>
+            </a:r>
+            <a:r>
+              <a:rPr lang="en-US" dirty="0">
+                <a:latin typeface="Charter Roman" panose="02040503050506020203" pitchFamily="18" charset="0"/>
+              </a:rPr>
+              <a:t>, Noah Lee, Chris Lee, and </a:t>
+            </a:r>
+            <a:r>
+              <a:rPr lang="en-US" dirty="0" err="1">
+                <a:latin typeface="Charter Roman" panose="02040503050506020203" pitchFamily="18" charset="0"/>
+              </a:rPr>
+              <a:t>Shuanger</a:t>
+            </a:r>
+            <a:r>
+              <a:rPr lang="en-US" dirty="0">
+                <a:latin typeface="Charter Roman" panose="02040503050506020203" pitchFamily="18" charset="0"/>
+              </a:rPr>
+              <a:t> Li</a:t>
+            </a:r>
           </a:p>
         </p:txBody>
       </p:sp>
@@ -3066,10 +3126,10 @@
           <a:p>
             <a:pPr algn="ctr"/>
             <a:r>
-              <a:rPr lang="en-US" sz="3600" dirty="0">
+              <a:rPr lang="en-US" sz="3600" b="1" dirty="0">
                 <a:latin typeface="Charter Roman" panose="02040503050506020203" pitchFamily="18" charset="0"/>
               </a:rPr>
-              <a:t>Biological Modeling:</a:t>
+              <a:t>Biological Modeling</a:t>
             </a:r>
             <a:br>
               <a:rPr lang="en-US" sz="3600" dirty="0">
@@ -3077,12 +3137,12 @@
               </a:rPr>
             </a:br>
             <a:r>
-              <a:rPr lang="en-US" sz="3600" i="1" dirty="0">
+              <a:rPr lang="en-US" sz="3600" b="1" i="1" dirty="0">
                 <a:latin typeface="Charter Roman" panose="02040503050506020203" pitchFamily="18" charset="0"/>
               </a:rPr>
               <a:t>A Short Tour</a:t>
             </a:r>
-            <a:endParaRPr lang="en-US" sz="3600" i="1" dirty="0">
+            <a:endParaRPr lang="en-US" sz="3600" b="1" i="1" dirty="0">
               <a:latin typeface="CHARTER ROMAN" panose="02040503050506020203" pitchFamily="18" charset="0"/>
             </a:endParaRPr>
           </a:p>
@@ -3102,8 +3162,8 @@
         </p:nvSpPr>
         <p:spPr>
           <a:xfrm>
-            <a:off x="1656455" y="7795696"/>
-            <a:ext cx="3087888" cy="338554"/>
+            <a:off x="1656455" y="7952601"/>
+            <a:ext cx="3087888" cy="276999"/>
           </a:xfrm>
           <a:prstGeom prst="rect">
             <a:avLst/>
@@ -3118,14 +3178,11 @@
           <a:p>
             <a:pPr algn="ctr"/>
             <a:r>
-              <a:rPr lang="en-US" sz="1600" dirty="0">
+              <a:rPr lang="en-US" sz="1200" dirty="0">
                 <a:latin typeface="Charter Roman" panose="02040503050506020203" pitchFamily="18" charset="0"/>
               </a:rPr>
               <a:t>© 2022</a:t>
             </a:r>
-            <a:endParaRPr lang="en-US" sz="1600" dirty="0">
-              <a:latin typeface="Charter Roman" panose="02040503050506020203" pitchFamily="18" charset="0"/>
-            </a:endParaRPr>
           </a:p>
         </p:txBody>
       </p:sp>
@@ -3164,8 +3221,8 @@
         </p:blipFill>
         <p:spPr>
           <a:xfrm>
-            <a:off x="1742539" y="2796863"/>
-            <a:ext cx="2915721" cy="2915721"/>
+            <a:off x="2133079" y="2982599"/>
+            <a:ext cx="2134629" cy="2134629"/>
           </a:xfrm>
           <a:prstGeom prst="rect">
             <a:avLst/>

</xml_diff>

<commit_message>
Updates to front matter
</commit_message>
<xml_diff>
--- a/figures/cover_page.pptx
+++ b/figures/cover_page.pptx
@@ -244,7 +244,7 @@
           <a:p>
             <a:fld id="{9D0A19FE-C9DB-594E-B6DA-BE8D5EA5DEA3}" type="datetimeFigureOut">
               <a:rPr lang="en-US" smtClean="0"/>
-              <a:t>10/5/22</a:t>
+              <a:t>10/17/22</a:t>
             </a:fld>
             <a:endParaRPr lang="en-US"/>
           </a:p>
@@ -414,7 +414,7 @@
           <a:p>
             <a:fld id="{9D0A19FE-C9DB-594E-B6DA-BE8D5EA5DEA3}" type="datetimeFigureOut">
               <a:rPr lang="en-US" smtClean="0"/>
-              <a:t>10/5/22</a:t>
+              <a:t>10/17/22</a:t>
             </a:fld>
             <a:endParaRPr lang="en-US"/>
           </a:p>
@@ -594,7 +594,7 @@
           <a:p>
             <a:fld id="{9D0A19FE-C9DB-594E-B6DA-BE8D5EA5DEA3}" type="datetimeFigureOut">
               <a:rPr lang="en-US" smtClean="0"/>
-              <a:t>10/5/22</a:t>
+              <a:t>10/17/22</a:t>
             </a:fld>
             <a:endParaRPr lang="en-US"/>
           </a:p>
@@ -764,7 +764,7 @@
           <a:p>
             <a:fld id="{9D0A19FE-C9DB-594E-B6DA-BE8D5EA5DEA3}" type="datetimeFigureOut">
               <a:rPr lang="en-US" smtClean="0"/>
-              <a:t>10/5/22</a:t>
+              <a:t>10/17/22</a:t>
             </a:fld>
             <a:endParaRPr lang="en-US"/>
           </a:p>
@@ -1008,7 +1008,7 @@
           <a:p>
             <a:fld id="{9D0A19FE-C9DB-594E-B6DA-BE8D5EA5DEA3}" type="datetimeFigureOut">
               <a:rPr lang="en-US" smtClean="0"/>
-              <a:t>10/5/22</a:t>
+              <a:t>10/17/22</a:t>
             </a:fld>
             <a:endParaRPr lang="en-US"/>
           </a:p>
@@ -1240,7 +1240,7 @@
           <a:p>
             <a:fld id="{9D0A19FE-C9DB-594E-B6DA-BE8D5EA5DEA3}" type="datetimeFigureOut">
               <a:rPr lang="en-US" smtClean="0"/>
-              <a:t>10/5/22</a:t>
+              <a:t>10/17/22</a:t>
             </a:fld>
             <a:endParaRPr lang="en-US"/>
           </a:p>
@@ -1607,7 +1607,7 @@
           <a:p>
             <a:fld id="{9D0A19FE-C9DB-594E-B6DA-BE8D5EA5DEA3}" type="datetimeFigureOut">
               <a:rPr lang="en-US" smtClean="0"/>
-              <a:t>10/5/22</a:t>
+              <a:t>10/17/22</a:t>
             </a:fld>
             <a:endParaRPr lang="en-US"/>
           </a:p>
@@ -1725,7 +1725,7 @@
           <a:p>
             <a:fld id="{9D0A19FE-C9DB-594E-B6DA-BE8D5EA5DEA3}" type="datetimeFigureOut">
               <a:rPr lang="en-US" smtClean="0"/>
-              <a:t>10/5/22</a:t>
+              <a:t>10/17/22</a:t>
             </a:fld>
             <a:endParaRPr lang="en-US"/>
           </a:p>
@@ -1820,7 +1820,7 @@
           <a:p>
             <a:fld id="{9D0A19FE-C9DB-594E-B6DA-BE8D5EA5DEA3}" type="datetimeFigureOut">
               <a:rPr lang="en-US" smtClean="0"/>
-              <a:t>10/5/22</a:t>
+              <a:t>10/17/22</a:t>
             </a:fld>
             <a:endParaRPr lang="en-US"/>
           </a:p>
@@ -2097,7 +2097,7 @@
           <a:p>
             <a:fld id="{9D0A19FE-C9DB-594E-B6DA-BE8D5EA5DEA3}" type="datetimeFigureOut">
               <a:rPr lang="en-US" smtClean="0"/>
-              <a:t>10/5/22</a:t>
+              <a:t>10/17/22</a:t>
             </a:fld>
             <a:endParaRPr lang="en-US"/>
           </a:p>
@@ -2354,7 +2354,7 @@
           <a:p>
             <a:fld id="{9D0A19FE-C9DB-594E-B6DA-BE8D5EA5DEA3}" type="datetimeFigureOut">
               <a:rPr lang="en-US" smtClean="0"/>
-              <a:t>10/5/22</a:t>
+              <a:t>10/17/22</a:t>
             </a:fld>
             <a:endParaRPr lang="en-US"/>
           </a:p>
@@ -2567,7 +2567,7 @@
           <a:p>
             <a:fld id="{9D0A19FE-C9DB-594E-B6DA-BE8D5EA5DEA3}" type="datetimeFigureOut">
               <a:rPr lang="en-US" smtClean="0"/>
-              <a:t>10/5/22</a:t>
+              <a:t>10/17/22</a:t>
             </a:fld>
             <a:endParaRPr lang="en-US"/>
           </a:p>
@@ -3016,7 +3016,7 @@
         <p:spPr>
           <a:xfrm>
             <a:off x="187031" y="4548979"/>
-            <a:ext cx="6026727" cy="1015663"/>
+            <a:ext cx="6026727" cy="1569660"/>
           </a:xfrm>
           <a:prstGeom prst="rect">
             <a:avLst/>
@@ -3052,12 +3052,22 @@
           </a:p>
           <a:p>
             <a:pPr algn="ctr"/>
-            <a:r>
+            <a:br>
               <a:rPr lang="en-US" dirty="0">
                 <a:latin typeface="Charter Roman" panose="02040503050506020203" pitchFamily="18" charset="0"/>
               </a:rPr>
-              <a:t>with </a:t>
-            </a:r>
+            </a:br>
+            <a:r>
+              <a:rPr lang="en-US" dirty="0">
+                <a:latin typeface="Charter Roman" panose="02040503050506020203" pitchFamily="18" charset="0"/>
+              </a:rPr>
+              <a:t>with</a:t>
+            </a:r>
+            <a:br>
+              <a:rPr lang="en-US" dirty="0">
+                <a:latin typeface="Charter Roman" panose="02040503050506020203" pitchFamily="18" charset="0"/>
+              </a:rPr>
+            </a:br>
             <a:r>
               <a:rPr lang="en-US" dirty="0" err="1">
                 <a:latin typeface="Charter Roman" panose="02040503050506020203" pitchFamily="18" charset="0"/>

</xml_diff>